<commit_message>
adding readme file and final presentation
</commit_message>
<xml_diff>
--- a/radiant_ranger_ksp_datathon_prototype_round.pptx
+++ b/radiant_ranger_ksp_datathon_prototype_round.pptx
@@ -16501,9 +16501,80 @@
                 <a:solidFill>
                   <a:srgbClr val="2F49AF"/>
                 </a:solidFill>
-                <a:hlinkClick r:id="rId4"/>
+                <a:hlinkClick r:id="rId4">
+                  <a:extLst>
+                    <a:ext uri="{A12FA001-AC4F-418D-AE19-62706E023703}">
+                      <ahyp:hlinkClr xmlns:ahyp="http://schemas.microsoft.com/office/drawing/2018/hyperlinkcolor" val="tx"/>
+                    </a:ext>
+                  </a:extLst>
+                </a:hlinkClick>
               </a:rPr>
-              <a:t>https://github.com/Ankan54/ksp-hackathon-radiant-ranger</a:t>
+              <a:t>https://github.com/Ankan54/</a:t>
+            </a:r>
+            <a:r>
+              <a:rPr lang="en-IN" u="sng" dirty="0">
+                <a:solidFill>
+                  <a:srgbClr val="2F49AF"/>
+                </a:solidFill>
+                <a:hlinkClick r:id="rId5">
+                  <a:extLst>
+                    <a:ext uri="{A12FA001-AC4F-418D-AE19-62706E023703}">
+                      <ahyp:hlinkClr xmlns:ahyp="http://schemas.microsoft.com/office/drawing/2018/hyperlinkcolor" val="tx"/>
+                    </a:ext>
+                  </a:extLst>
+                </a:hlinkClick>
+              </a:rPr>
+              <a:t>ksp-hackathon-radiant-ranger</a:t>
+            </a:r>
+            <a:endParaRPr lang="en-IN" u="sng" dirty="0">
+              <a:solidFill>
+                <a:srgbClr val="2F49AF"/>
+              </a:solidFill>
+            </a:endParaRPr>
+          </a:p>
+        </p:txBody>
+      </p:sp>
+      <p:sp>
+        <p:nvSpPr>
+          <p:cNvPr id="3" name="Rectangle 2">
+            <a:extLst>
+              <a:ext uri="{FF2B5EF4-FFF2-40B4-BE49-F238E27FC236}">
+                <a16:creationId xmlns:a16="http://schemas.microsoft.com/office/drawing/2014/main" id="{12FEAD48-8FA0-4589-8644-3796C47D422C}"/>
+              </a:ext>
+            </a:extLst>
+          </p:cNvPr>
+          <p:cNvSpPr/>
+          <p:nvPr/>
+        </p:nvSpPr>
+        <p:spPr>
+          <a:xfrm>
+            <a:off x="563526" y="3082680"/>
+            <a:ext cx="7857460" cy="307777"/>
+          </a:xfrm>
+          <a:prstGeom prst="rect">
+            <a:avLst/>
+          </a:prstGeom>
+        </p:spPr>
+        <p:txBody>
+          <a:bodyPr wrap="square">
+            <a:spAutoFit/>
+          </a:bodyPr>
+          <a:lstStyle/>
+          <a:p>
+            <a:r>
+              <a:rPr lang="en-IN" u="sng" dirty="0">
+                <a:solidFill>
+                  <a:srgbClr val="2F49AF"/>
+                </a:solidFill>
+                <a:hlinkClick r:id="rId6">
+                  <a:extLst>
+                    <a:ext uri="{A12FA001-AC4F-418D-AE19-62706E023703}">
+                      <ahyp:hlinkClr xmlns:ahyp="http://schemas.microsoft.com/office/drawing/2018/hyperlinkcolor" val="tx"/>
+                    </a:ext>
+                  </a:extLst>
+                </a:hlinkClick>
+              </a:rPr>
+              <a:t>https://drive.google.com/file/d/1TRsYCmJyxMHgJmRTN_94RPCixIQtjIiX/view?usp=drive_link</a:t>
             </a:r>
             <a:endParaRPr lang="en-IN" u="sng" dirty="0">
               <a:solidFill>

</xml_diff>

<commit_message>
added code to use Gemini API
</commit_message>
<xml_diff>
--- a/radiant_ranger_ksp_datathon_prototype_round.pptx
+++ b/radiant_ranger_ksp_datathon_prototype_round.pptx
@@ -11,8 +11,8 @@
     <p:sldId id="256" r:id="rId2"/>
     <p:sldId id="257" r:id="rId3"/>
     <p:sldId id="258" r:id="rId4"/>
-    <p:sldId id="259" r:id="rId5"/>
-    <p:sldId id="268" r:id="rId6"/>
+    <p:sldId id="268" r:id="rId5"/>
+    <p:sldId id="273" r:id="rId6"/>
     <p:sldId id="260" r:id="rId7"/>
     <p:sldId id="261" r:id="rId8"/>
     <p:sldId id="262" r:id="rId9"/>
@@ -10385,6 +10385,11 @@
         </p:txBody>
       </p:sp>
     </p:spTree>
+    <p:extLst>
+      <p:ext uri="{BB962C8B-B14F-4D97-AF65-F5344CB8AC3E}">
+        <p14:creationId xmlns:p14="http://schemas.microsoft.com/office/powerpoint/2010/main" val="560836710"/>
+      </p:ext>
+    </p:extLst>
   </p:cSld>
   <p:clrMapOvr>
     <a:masterClrMapping/>
@@ -10491,7 +10496,7 @@
     </p:spTree>
     <p:extLst>
       <p:ext uri="{BB962C8B-B14F-4D97-AF65-F5344CB8AC3E}">
-        <p14:creationId xmlns:p14="http://schemas.microsoft.com/office/powerpoint/2010/main" val="560836710"/>
+        <p14:creationId xmlns:p14="http://schemas.microsoft.com/office/powerpoint/2010/main" val="678723432"/>
       </p:ext>
     </p:extLst>
   </p:cSld>
@@ -18904,652 +18909,6 @@
           </a:p>
         </p:txBody>
       </p:sp>
-      <p:sp>
-        <p:nvSpPr>
-          <p:cNvPr id="79" name="Google Shape;79;p16"/>
-          <p:cNvSpPr txBox="1">
-            <a:spLocks noGrp="1"/>
-          </p:cNvSpPr>
-          <p:nvPr>
-            <p:ph type="body" idx="1"/>
-          </p:nvPr>
-        </p:nvSpPr>
-        <p:spPr>
-          <a:xfrm>
-            <a:off x="311700" y="1152475"/>
-            <a:ext cx="8520600" cy="3416400"/>
-          </a:xfrm>
-          <a:prstGeom prst="rect">
-            <a:avLst/>
-          </a:prstGeom>
-        </p:spPr>
-        <p:txBody>
-          <a:bodyPr spcFirstLastPara="1" wrap="square" lIns="91425" tIns="91425" rIns="91425" bIns="91425" anchor="t" anchorCtr="0">
-            <a:normAutofit/>
-          </a:bodyPr>
-          <a:lstStyle/>
-          <a:p>
-            <a:pPr marL="0" lvl="0" indent="0" algn="l" rtl="0">
-              <a:spcBef>
-                <a:spcPts val="0"/>
-              </a:spcBef>
-              <a:spcAft>
-                <a:spcPts val="1200"/>
-              </a:spcAft>
-              <a:buNone/>
-            </a:pPr>
-            <a:endParaRPr/>
-          </a:p>
-        </p:txBody>
-      </p:sp>
-      <p:pic>
-        <p:nvPicPr>
-          <p:cNvPr id="80" name="Google Shape;80;p16"/>
-          <p:cNvPicPr preferRelativeResize="0"/>
-          <p:nvPr/>
-        </p:nvPicPr>
-        <p:blipFill>
-          <a:blip r:embed="rId3">
-            <a:alphaModFix/>
-          </a:blip>
-          <a:stretch>
-            <a:fillRect/>
-          </a:stretch>
-        </p:blipFill>
-        <p:spPr>
-          <a:xfrm>
-            <a:off x="0" y="0"/>
-            <a:ext cx="9144003" cy="5143501"/>
-          </a:xfrm>
-          <a:prstGeom prst="rect">
-            <a:avLst/>
-          </a:prstGeom>
-          <a:noFill/>
-          <a:ln>
-            <a:noFill/>
-          </a:ln>
-        </p:spPr>
-      </p:pic>
-      <p:pic>
-        <p:nvPicPr>
-          <p:cNvPr id="6" name="Picture 5">
-            <a:extLst>
-              <a:ext uri="{FF2B5EF4-FFF2-40B4-BE49-F238E27FC236}">
-                <a16:creationId xmlns:a16="http://schemas.microsoft.com/office/drawing/2014/main" id="{09591489-6238-4B27-90A1-5105964EACAD}"/>
-              </a:ext>
-            </a:extLst>
-          </p:cNvPr>
-          <p:cNvPicPr>
-            <a:picLocks noChangeAspect="1"/>
-          </p:cNvPicPr>
-          <p:nvPr/>
-        </p:nvPicPr>
-        <p:blipFill>
-          <a:blip r:embed="rId4"/>
-          <a:stretch>
-            <a:fillRect/>
-          </a:stretch>
-        </p:blipFill>
-        <p:spPr>
-          <a:xfrm>
-            <a:off x="1221877" y="1159402"/>
-            <a:ext cx="6682047" cy="3548777"/>
-          </a:xfrm>
-          <a:prstGeom prst="rect">
-            <a:avLst/>
-          </a:prstGeom>
-        </p:spPr>
-      </p:pic>
-      <p:sp>
-        <p:nvSpPr>
-          <p:cNvPr id="7" name="Google Shape;80;p16">
-            <a:extLst>
-              <a:ext uri="{FF2B5EF4-FFF2-40B4-BE49-F238E27FC236}">
-                <a16:creationId xmlns:a16="http://schemas.microsoft.com/office/drawing/2014/main" id="{2A45FA4F-C9D0-456A-BF4D-72ADD3A8F203}"/>
-              </a:ext>
-            </a:extLst>
-          </p:cNvPr>
-          <p:cNvSpPr txBox="1"/>
-          <p:nvPr/>
-        </p:nvSpPr>
-        <p:spPr>
-          <a:xfrm>
-            <a:off x="0" y="666802"/>
-            <a:ext cx="8680800" cy="492600"/>
-          </a:xfrm>
-          <a:prstGeom prst="rect">
-            <a:avLst/>
-          </a:prstGeom>
-          <a:noFill/>
-          <a:ln>
-            <a:noFill/>
-          </a:ln>
-        </p:spPr>
-        <p:txBody>
-          <a:bodyPr spcFirstLastPara="1" wrap="square" lIns="91425" tIns="91425" rIns="91425" bIns="91425" anchor="t" anchorCtr="0">
-            <a:noAutofit/>
-          </a:bodyPr>
-          <a:lstStyle/>
-          <a:p>
-            <a:pPr marL="0" lvl="0" indent="0" algn="l" rtl="0">
-              <a:spcBef>
-                <a:spcPts val="0"/>
-              </a:spcBef>
-              <a:spcAft>
-                <a:spcPts val="0"/>
-              </a:spcAft>
-              <a:buNone/>
-            </a:pPr>
-            <a:r>
-              <a:rPr lang="en-GB" sz="1800" dirty="0">
-                <a:solidFill>
-                  <a:srgbClr val="595959"/>
-                </a:solidFill>
-                <a:latin typeface="Cambria" panose="02040503050406030204" pitchFamily="18" charset="0"/>
-                <a:ea typeface="Cambria" panose="02040503050406030204" pitchFamily="18" charset="0"/>
-              </a:rPr>
-              <a:t>Logical Architecture</a:t>
-            </a:r>
-            <a:endParaRPr sz="1800" dirty="0">
-              <a:solidFill>
-                <a:srgbClr val="595959"/>
-              </a:solidFill>
-              <a:latin typeface="Cambria" panose="02040503050406030204" pitchFamily="18" charset="0"/>
-              <a:ea typeface="Cambria" panose="02040503050406030204" pitchFamily="18" charset="0"/>
-            </a:endParaRPr>
-          </a:p>
-        </p:txBody>
-      </p:sp>
-      <p:sp>
-        <p:nvSpPr>
-          <p:cNvPr id="8" name="TextBox 7">
-            <a:extLst>
-              <a:ext uri="{FF2B5EF4-FFF2-40B4-BE49-F238E27FC236}">
-                <a16:creationId xmlns:a16="http://schemas.microsoft.com/office/drawing/2014/main" id="{1E01B94F-8816-4BCA-AD04-0FB5B227E49E}"/>
-              </a:ext>
-            </a:extLst>
-          </p:cNvPr>
-          <p:cNvSpPr txBox="1"/>
-          <p:nvPr/>
-        </p:nvSpPr>
-        <p:spPr>
-          <a:xfrm>
-            <a:off x="2161309" y="4671924"/>
-            <a:ext cx="686406" cy="253916"/>
-          </a:xfrm>
-          <a:prstGeom prst="rect">
-            <a:avLst/>
-          </a:prstGeom>
-          <a:noFill/>
-        </p:spPr>
-        <p:txBody>
-          <a:bodyPr wrap="none" rtlCol="0">
-            <a:spAutoFit/>
-          </a:bodyPr>
-          <a:lstStyle/>
-          <a:p>
-            <a:r>
-              <a:rPr lang="en-US" sz="1050" i="1" dirty="0">
-                <a:solidFill>
-                  <a:schemeClr val="accent1">
-                    <a:lumMod val="75000"/>
-                  </a:schemeClr>
-                </a:solidFill>
-                <a:latin typeface="Calibri" panose="020F0502020204030204" pitchFamily="34" charset="0"/>
-                <a:cs typeface="Calibri" panose="020F0502020204030204" pitchFamily="34" charset="0"/>
-              </a:rPr>
-              <a:t>Ingestion</a:t>
-            </a:r>
-            <a:endParaRPr lang="en-IN" sz="1050" i="1" dirty="0">
-              <a:solidFill>
-                <a:schemeClr val="accent1">
-                  <a:lumMod val="75000"/>
-                </a:schemeClr>
-              </a:solidFill>
-              <a:latin typeface="Calibri" panose="020F0502020204030204" pitchFamily="34" charset="0"/>
-              <a:cs typeface="Calibri" panose="020F0502020204030204" pitchFamily="34" charset="0"/>
-            </a:endParaRPr>
-          </a:p>
-        </p:txBody>
-      </p:sp>
-      <p:sp>
-        <p:nvSpPr>
-          <p:cNvPr id="9" name="TextBox 8">
-            <a:extLst>
-              <a:ext uri="{FF2B5EF4-FFF2-40B4-BE49-F238E27FC236}">
-                <a16:creationId xmlns:a16="http://schemas.microsoft.com/office/drawing/2014/main" id="{09F9B2EC-0033-4595-8157-F081A09FC1BF}"/>
-              </a:ext>
-            </a:extLst>
-          </p:cNvPr>
-          <p:cNvSpPr txBox="1"/>
-          <p:nvPr/>
-        </p:nvSpPr>
-        <p:spPr>
-          <a:xfrm>
-            <a:off x="3667077" y="4671924"/>
-            <a:ext cx="805029" cy="253916"/>
-          </a:xfrm>
-          <a:prstGeom prst="rect">
-            <a:avLst/>
-          </a:prstGeom>
-          <a:noFill/>
-        </p:spPr>
-        <p:txBody>
-          <a:bodyPr wrap="none" rtlCol="0">
-            <a:spAutoFit/>
-          </a:bodyPr>
-          <a:lstStyle/>
-          <a:p>
-            <a:r>
-              <a:rPr lang="en-US" sz="1050" i="1" dirty="0">
-                <a:solidFill>
-                  <a:schemeClr val="accent1">
-                    <a:lumMod val="75000"/>
-                  </a:schemeClr>
-                </a:solidFill>
-                <a:latin typeface="Calibri" panose="020F0502020204030204" pitchFamily="34" charset="0"/>
-                <a:cs typeface="Calibri" panose="020F0502020204030204" pitchFamily="34" charset="0"/>
-              </a:rPr>
-              <a:t>Enrichment</a:t>
-            </a:r>
-            <a:endParaRPr lang="en-IN" sz="1050" i="1" dirty="0">
-              <a:solidFill>
-                <a:schemeClr val="accent1">
-                  <a:lumMod val="75000"/>
-                </a:schemeClr>
-              </a:solidFill>
-              <a:latin typeface="Calibri" panose="020F0502020204030204" pitchFamily="34" charset="0"/>
-              <a:cs typeface="Calibri" panose="020F0502020204030204" pitchFamily="34" charset="0"/>
-            </a:endParaRPr>
-          </a:p>
-        </p:txBody>
-      </p:sp>
-      <p:sp>
-        <p:nvSpPr>
-          <p:cNvPr id="10" name="TextBox 9">
-            <a:extLst>
-              <a:ext uri="{FF2B5EF4-FFF2-40B4-BE49-F238E27FC236}">
-                <a16:creationId xmlns:a16="http://schemas.microsoft.com/office/drawing/2014/main" id="{8D673AE9-2E9F-4926-8178-A3F5F3CFD4EB}"/>
-              </a:ext>
-            </a:extLst>
-          </p:cNvPr>
-          <p:cNvSpPr txBox="1"/>
-          <p:nvPr/>
-        </p:nvSpPr>
-        <p:spPr>
-          <a:xfrm>
-            <a:off x="5267277" y="4671924"/>
-            <a:ext cx="607859" cy="253916"/>
-          </a:xfrm>
-          <a:prstGeom prst="rect">
-            <a:avLst/>
-          </a:prstGeom>
-          <a:noFill/>
-        </p:spPr>
-        <p:txBody>
-          <a:bodyPr wrap="none" rtlCol="0">
-            <a:spAutoFit/>
-          </a:bodyPr>
-          <a:lstStyle/>
-          <a:p>
-            <a:r>
-              <a:rPr lang="en-US" sz="1050" i="1" dirty="0">
-                <a:solidFill>
-                  <a:schemeClr val="accent1">
-                    <a:lumMod val="75000"/>
-                  </a:schemeClr>
-                </a:solidFill>
-                <a:latin typeface="Calibri" panose="020F0502020204030204" pitchFamily="34" charset="0"/>
-                <a:cs typeface="Calibri" panose="020F0502020204030204" pitchFamily="34" charset="0"/>
-              </a:rPr>
-              <a:t>Storage</a:t>
-            </a:r>
-            <a:endParaRPr lang="en-IN" sz="1050" i="1" dirty="0">
-              <a:solidFill>
-                <a:schemeClr val="accent1">
-                  <a:lumMod val="75000"/>
-                </a:schemeClr>
-              </a:solidFill>
-              <a:latin typeface="Calibri" panose="020F0502020204030204" pitchFamily="34" charset="0"/>
-              <a:cs typeface="Calibri" panose="020F0502020204030204" pitchFamily="34" charset="0"/>
-            </a:endParaRPr>
-          </a:p>
-        </p:txBody>
-      </p:sp>
-      <p:sp>
-        <p:nvSpPr>
-          <p:cNvPr id="11" name="TextBox 10">
-            <a:extLst>
-              <a:ext uri="{FF2B5EF4-FFF2-40B4-BE49-F238E27FC236}">
-                <a16:creationId xmlns:a16="http://schemas.microsoft.com/office/drawing/2014/main" id="{6293A378-767A-42A6-9FF4-2A8A381CF39C}"/>
-              </a:ext>
-            </a:extLst>
-          </p:cNvPr>
-          <p:cNvSpPr txBox="1"/>
-          <p:nvPr/>
-        </p:nvSpPr>
-        <p:spPr>
-          <a:xfrm>
-            <a:off x="6524840" y="4671924"/>
-            <a:ext cx="878767" cy="253916"/>
-          </a:xfrm>
-          <a:prstGeom prst="rect">
-            <a:avLst/>
-          </a:prstGeom>
-          <a:noFill/>
-        </p:spPr>
-        <p:txBody>
-          <a:bodyPr wrap="none" rtlCol="0">
-            <a:spAutoFit/>
-          </a:bodyPr>
-          <a:lstStyle/>
-          <a:p>
-            <a:r>
-              <a:rPr lang="en-US" sz="1050" i="1" dirty="0">
-                <a:solidFill>
-                  <a:schemeClr val="accent1">
-                    <a:lumMod val="75000"/>
-                  </a:schemeClr>
-                </a:solidFill>
-                <a:latin typeface="Calibri" panose="020F0502020204030204" pitchFamily="34" charset="0"/>
-                <a:cs typeface="Calibri" panose="020F0502020204030204" pitchFamily="34" charset="0"/>
-              </a:rPr>
-              <a:t>Visualization</a:t>
-            </a:r>
-            <a:endParaRPr lang="en-IN" sz="1050" i="1" dirty="0">
-              <a:solidFill>
-                <a:schemeClr val="accent1">
-                  <a:lumMod val="75000"/>
-                </a:schemeClr>
-              </a:solidFill>
-              <a:latin typeface="Calibri" panose="020F0502020204030204" pitchFamily="34" charset="0"/>
-              <a:cs typeface="Calibri" panose="020F0502020204030204" pitchFamily="34" charset="0"/>
-            </a:endParaRPr>
-          </a:p>
-        </p:txBody>
-      </p:sp>
-      <p:cxnSp>
-        <p:nvCxnSpPr>
-          <p:cNvPr id="12" name="Straight Connector 11">
-            <a:extLst>
-              <a:ext uri="{FF2B5EF4-FFF2-40B4-BE49-F238E27FC236}">
-                <a16:creationId xmlns:a16="http://schemas.microsoft.com/office/drawing/2014/main" id="{59A7DC01-D646-4444-A56D-087DCB9D5C28}"/>
-              </a:ext>
-            </a:extLst>
-          </p:cNvPr>
-          <p:cNvCxnSpPr/>
-          <p:nvPr/>
-        </p:nvCxnSpPr>
-        <p:spPr>
-          <a:xfrm>
-            <a:off x="3318164" y="1267691"/>
-            <a:ext cx="0" cy="3658149"/>
-          </a:xfrm>
-          <a:prstGeom prst="line">
-            <a:avLst/>
-          </a:prstGeom>
-          <a:ln>
-            <a:solidFill>
-              <a:schemeClr val="bg2">
-                <a:lumMod val="20000"/>
-                <a:lumOff val="80000"/>
-              </a:schemeClr>
-            </a:solidFill>
-            <a:prstDash val="dash"/>
-          </a:ln>
-        </p:spPr>
-        <p:style>
-          <a:lnRef idx="1">
-            <a:schemeClr val="accent1"/>
-          </a:lnRef>
-          <a:fillRef idx="0">
-            <a:schemeClr val="accent1"/>
-          </a:fillRef>
-          <a:effectRef idx="0">
-            <a:schemeClr val="accent1"/>
-          </a:effectRef>
-          <a:fontRef idx="minor">
-            <a:schemeClr val="tx1"/>
-          </a:fontRef>
-        </p:style>
-      </p:cxnSp>
-      <p:cxnSp>
-        <p:nvCxnSpPr>
-          <p:cNvPr id="13" name="Straight Connector 12">
-            <a:extLst>
-              <a:ext uri="{FF2B5EF4-FFF2-40B4-BE49-F238E27FC236}">
-                <a16:creationId xmlns:a16="http://schemas.microsoft.com/office/drawing/2014/main" id="{ED7CA7F4-53E3-4124-8CFC-7A4863710D1E}"/>
-              </a:ext>
-            </a:extLst>
-          </p:cNvPr>
-          <p:cNvCxnSpPr/>
-          <p:nvPr/>
-        </p:nvCxnSpPr>
-        <p:spPr>
-          <a:xfrm>
-            <a:off x="4966861" y="1267690"/>
-            <a:ext cx="0" cy="3658149"/>
-          </a:xfrm>
-          <a:prstGeom prst="line">
-            <a:avLst/>
-          </a:prstGeom>
-          <a:ln>
-            <a:solidFill>
-              <a:schemeClr val="bg2">
-                <a:lumMod val="20000"/>
-                <a:lumOff val="80000"/>
-              </a:schemeClr>
-            </a:solidFill>
-            <a:prstDash val="dash"/>
-          </a:ln>
-        </p:spPr>
-        <p:style>
-          <a:lnRef idx="1">
-            <a:schemeClr val="accent1"/>
-          </a:lnRef>
-          <a:fillRef idx="0">
-            <a:schemeClr val="accent1"/>
-          </a:fillRef>
-          <a:effectRef idx="0">
-            <a:schemeClr val="accent1"/>
-          </a:effectRef>
-          <a:fontRef idx="minor">
-            <a:schemeClr val="tx1"/>
-          </a:fontRef>
-        </p:style>
-      </p:cxnSp>
-      <p:cxnSp>
-        <p:nvCxnSpPr>
-          <p:cNvPr id="14" name="Straight Connector 13">
-            <a:extLst>
-              <a:ext uri="{FF2B5EF4-FFF2-40B4-BE49-F238E27FC236}">
-                <a16:creationId xmlns:a16="http://schemas.microsoft.com/office/drawing/2014/main" id="{857EC3FA-3778-4618-95EF-D8F470540783}"/>
-              </a:ext>
-            </a:extLst>
-          </p:cNvPr>
-          <p:cNvCxnSpPr/>
-          <p:nvPr/>
-        </p:nvCxnSpPr>
-        <p:spPr>
-          <a:xfrm>
-            <a:off x="6102932" y="1267690"/>
-            <a:ext cx="0" cy="3658149"/>
-          </a:xfrm>
-          <a:prstGeom prst="line">
-            <a:avLst/>
-          </a:prstGeom>
-          <a:ln>
-            <a:solidFill>
-              <a:schemeClr val="bg2">
-                <a:lumMod val="20000"/>
-                <a:lumOff val="80000"/>
-              </a:schemeClr>
-            </a:solidFill>
-            <a:prstDash val="dash"/>
-          </a:ln>
-        </p:spPr>
-        <p:style>
-          <a:lnRef idx="1">
-            <a:schemeClr val="accent1"/>
-          </a:lnRef>
-          <a:fillRef idx="0">
-            <a:schemeClr val="accent1"/>
-          </a:fillRef>
-          <a:effectRef idx="0">
-            <a:schemeClr val="accent1"/>
-          </a:effectRef>
-          <a:fontRef idx="minor">
-            <a:schemeClr val="tx1"/>
-          </a:fontRef>
-        </p:style>
-      </p:cxnSp>
-      <p:sp>
-        <p:nvSpPr>
-          <p:cNvPr id="15" name="TextBox 14">
-            <a:extLst>
-              <a:ext uri="{FF2B5EF4-FFF2-40B4-BE49-F238E27FC236}">
-                <a16:creationId xmlns:a16="http://schemas.microsoft.com/office/drawing/2014/main" id="{126FFFDC-C01D-45B1-A1C8-6CDB1D8080D8}"/>
-              </a:ext>
-            </a:extLst>
-          </p:cNvPr>
-          <p:cNvSpPr txBox="1"/>
-          <p:nvPr/>
-        </p:nvSpPr>
-        <p:spPr>
-          <a:xfrm>
-            <a:off x="7260245" y="673621"/>
-            <a:ext cx="1883849" cy="584775"/>
-          </a:xfrm>
-          <a:prstGeom prst="rect">
-            <a:avLst/>
-          </a:prstGeom>
-          <a:noFill/>
-        </p:spPr>
-        <p:txBody>
-          <a:bodyPr wrap="none" rtlCol="0">
-            <a:spAutoFit/>
-          </a:bodyPr>
-          <a:lstStyle/>
-          <a:p>
-            <a:r>
-              <a:rPr lang="en-US" sz="800" i="1" dirty="0">
-                <a:solidFill>
-                  <a:srgbClr val="FF0000"/>
-                </a:solidFill>
-                <a:latin typeface="Calibri" panose="020F0502020204030204" pitchFamily="34" charset="0"/>
-                <a:cs typeface="Calibri" panose="020F0502020204030204" pitchFamily="34" charset="0"/>
-              </a:rPr>
-              <a:t>Assumption:</a:t>
-            </a:r>
-          </a:p>
-          <a:p>
-            <a:r>
-              <a:rPr lang="en-US" sz="800" i="1" dirty="0">
-                <a:solidFill>
-                  <a:srgbClr val="FF0000"/>
-                </a:solidFill>
-                <a:latin typeface="Calibri" panose="020F0502020204030204" pitchFamily="34" charset="0"/>
-                <a:cs typeface="Calibri" panose="020F0502020204030204" pitchFamily="34" charset="0"/>
-              </a:rPr>
-              <a:t>Police Personnel Details and Deployment</a:t>
-            </a:r>
-          </a:p>
-          <a:p>
-            <a:r>
-              <a:rPr lang="en-US" sz="800" i="1" dirty="0">
-                <a:solidFill>
-                  <a:srgbClr val="FF0000"/>
-                </a:solidFill>
-                <a:latin typeface="Calibri" panose="020F0502020204030204" pitchFamily="34" charset="0"/>
-                <a:cs typeface="Calibri" panose="020F0502020204030204" pitchFamily="34" charset="0"/>
-              </a:rPr>
-              <a:t>Information is already recorded in a</a:t>
-            </a:r>
-          </a:p>
-          <a:p>
-            <a:r>
-              <a:rPr lang="en-US" sz="800" i="1" dirty="0">
-                <a:solidFill>
-                  <a:srgbClr val="FF0000"/>
-                </a:solidFill>
-                <a:latin typeface="Calibri" panose="020F0502020204030204" pitchFamily="34" charset="0"/>
-                <a:cs typeface="Calibri" panose="020F0502020204030204" pitchFamily="34" charset="0"/>
-              </a:rPr>
-              <a:t> separate database</a:t>
-            </a:r>
-            <a:endParaRPr lang="en-IN" sz="800" i="1" dirty="0">
-              <a:solidFill>
-                <a:srgbClr val="FF0000"/>
-              </a:solidFill>
-              <a:latin typeface="Calibri" panose="020F0502020204030204" pitchFamily="34" charset="0"/>
-              <a:cs typeface="Calibri" panose="020F0502020204030204" pitchFamily="34" charset="0"/>
-            </a:endParaRPr>
-          </a:p>
-        </p:txBody>
-      </p:sp>
-    </p:spTree>
-  </p:cSld>
-  <p:clrMapOvr>
-    <a:masterClrMapping/>
-  </p:clrMapOvr>
-</p:sld>
-</file>
-
-<file path=ppt/slides/slide5.xml><?xml version="1.0" encoding="utf-8"?>
-<p:sld xmlns:a="http://schemas.openxmlformats.org/drawingml/2006/main" xmlns:r="http://schemas.openxmlformats.org/officeDocument/2006/relationships" xmlns:p="http://schemas.openxmlformats.org/presentationml/2006/main">
-  <p:cSld>
-    <p:spTree>
-      <p:nvGrpSpPr>
-        <p:cNvPr id="1" name="Shape 77"/>
-        <p:cNvGrpSpPr/>
-        <p:nvPr/>
-      </p:nvGrpSpPr>
-      <p:grpSpPr>
-        <a:xfrm>
-          <a:off x="0" y="0"/>
-          <a:ext cx="0" cy="0"/>
-          <a:chOff x="0" y="0"/>
-          <a:chExt cx="0" cy="0"/>
-        </a:xfrm>
-      </p:grpSpPr>
-      <p:sp>
-        <p:nvSpPr>
-          <p:cNvPr id="78" name="Google Shape;78;p16"/>
-          <p:cNvSpPr txBox="1">
-            <a:spLocks noGrp="1"/>
-          </p:cNvSpPr>
-          <p:nvPr>
-            <p:ph type="title"/>
-          </p:nvPr>
-        </p:nvSpPr>
-        <p:spPr>
-          <a:xfrm>
-            <a:off x="311700" y="445025"/>
-            <a:ext cx="8520600" cy="572700"/>
-          </a:xfrm>
-          <a:prstGeom prst="rect">
-            <a:avLst/>
-          </a:prstGeom>
-        </p:spPr>
-        <p:txBody>
-          <a:bodyPr spcFirstLastPara="1" wrap="square" lIns="91425" tIns="91425" rIns="91425" bIns="91425" anchor="t" anchorCtr="0">
-            <a:normAutofit fontScale="90000"/>
-          </a:bodyPr>
-          <a:lstStyle/>
-          <a:p>
-            <a:pPr marL="0" lvl="0" indent="0" algn="l" rtl="0">
-              <a:spcBef>
-                <a:spcPts val="0"/>
-              </a:spcBef>
-              <a:spcAft>
-                <a:spcPts val="0"/>
-              </a:spcAft>
-              <a:buNone/>
-            </a:pPr>
-            <a:endParaRPr/>
-          </a:p>
-        </p:txBody>
-      </p:sp>
       <p:pic>
         <p:nvPicPr>
           <p:cNvPr id="80" name="Google Shape;80;p16"/>
@@ -19668,10 +19027,551 @@
           </a:p>
         </p:txBody>
       </p:sp>
+      <p:sp>
+        <p:nvSpPr>
+          <p:cNvPr id="6" name="TextBox 5">
+            <a:extLst>
+              <a:ext uri="{FF2B5EF4-FFF2-40B4-BE49-F238E27FC236}">
+                <a16:creationId xmlns:a16="http://schemas.microsoft.com/office/drawing/2014/main" id="{5B981E69-8528-4133-AE7D-9702B2EDBC7F}"/>
+              </a:ext>
+            </a:extLst>
+          </p:cNvPr>
+          <p:cNvSpPr txBox="1"/>
+          <p:nvPr/>
+        </p:nvSpPr>
+        <p:spPr>
+          <a:xfrm>
+            <a:off x="79724" y="4184310"/>
+            <a:ext cx="1883849" cy="584775"/>
+          </a:xfrm>
+          <a:prstGeom prst="rect">
+            <a:avLst/>
+          </a:prstGeom>
+          <a:noFill/>
+        </p:spPr>
+        <p:txBody>
+          <a:bodyPr wrap="none" rtlCol="0">
+            <a:spAutoFit/>
+          </a:bodyPr>
+          <a:lstStyle/>
+          <a:p>
+            <a:r>
+              <a:rPr lang="en-US" sz="800" i="1" dirty="0">
+                <a:solidFill>
+                  <a:srgbClr val="FF0000"/>
+                </a:solidFill>
+                <a:latin typeface="Calibri" panose="020F0502020204030204" pitchFamily="34" charset="0"/>
+                <a:cs typeface="Calibri" panose="020F0502020204030204" pitchFamily="34" charset="0"/>
+              </a:rPr>
+              <a:t>Assumption:</a:t>
+            </a:r>
+          </a:p>
+          <a:p>
+            <a:r>
+              <a:rPr lang="en-US" sz="800" i="1" dirty="0">
+                <a:solidFill>
+                  <a:srgbClr val="FF0000"/>
+                </a:solidFill>
+                <a:latin typeface="Calibri" panose="020F0502020204030204" pitchFamily="34" charset="0"/>
+                <a:cs typeface="Calibri" panose="020F0502020204030204" pitchFamily="34" charset="0"/>
+              </a:rPr>
+              <a:t>Police Personnel Details and Deployment</a:t>
+            </a:r>
+          </a:p>
+          <a:p>
+            <a:r>
+              <a:rPr lang="en-US" sz="800" i="1" dirty="0">
+                <a:solidFill>
+                  <a:srgbClr val="FF0000"/>
+                </a:solidFill>
+                <a:latin typeface="Calibri" panose="020F0502020204030204" pitchFamily="34" charset="0"/>
+                <a:cs typeface="Calibri" panose="020F0502020204030204" pitchFamily="34" charset="0"/>
+              </a:rPr>
+              <a:t>Information is already recorded in a</a:t>
+            </a:r>
+          </a:p>
+          <a:p>
+            <a:r>
+              <a:rPr lang="en-US" sz="800" i="1" dirty="0">
+                <a:solidFill>
+                  <a:srgbClr val="FF0000"/>
+                </a:solidFill>
+                <a:latin typeface="Calibri" panose="020F0502020204030204" pitchFamily="34" charset="0"/>
+                <a:cs typeface="Calibri" panose="020F0502020204030204" pitchFamily="34" charset="0"/>
+              </a:rPr>
+              <a:t> separate database</a:t>
+            </a:r>
+            <a:endParaRPr lang="en-IN" sz="800" i="1" dirty="0">
+              <a:solidFill>
+                <a:srgbClr val="FF0000"/>
+              </a:solidFill>
+              <a:latin typeface="Calibri" panose="020F0502020204030204" pitchFamily="34" charset="0"/>
+              <a:cs typeface="Calibri" panose="020F0502020204030204" pitchFamily="34" charset="0"/>
+            </a:endParaRPr>
+          </a:p>
+        </p:txBody>
+      </p:sp>
     </p:spTree>
     <p:extLst>
       <p:ext uri="{BB962C8B-B14F-4D97-AF65-F5344CB8AC3E}">
         <p14:creationId xmlns:p14="http://schemas.microsoft.com/office/powerpoint/2010/main" val="3380432769"/>
+      </p:ext>
+    </p:extLst>
+  </p:cSld>
+  <p:clrMapOvr>
+    <a:masterClrMapping/>
+  </p:clrMapOvr>
+</p:sld>
+</file>
+
+<file path=ppt/slides/slide5.xml><?xml version="1.0" encoding="utf-8"?>
+<p:sld xmlns:a="http://schemas.openxmlformats.org/drawingml/2006/main" xmlns:r="http://schemas.openxmlformats.org/officeDocument/2006/relationships" xmlns:p="http://schemas.openxmlformats.org/presentationml/2006/main">
+  <p:cSld>
+    <p:spTree>
+      <p:nvGrpSpPr>
+        <p:cNvPr id="1" name="Shape 77"/>
+        <p:cNvGrpSpPr/>
+        <p:nvPr/>
+      </p:nvGrpSpPr>
+      <p:grpSpPr>
+        <a:xfrm>
+          <a:off x="0" y="0"/>
+          <a:ext cx="0" cy="0"/>
+          <a:chOff x="0" y="0"/>
+          <a:chExt cx="0" cy="0"/>
+        </a:xfrm>
+      </p:grpSpPr>
+      <p:sp>
+        <p:nvSpPr>
+          <p:cNvPr id="78" name="Google Shape;78;p16"/>
+          <p:cNvSpPr txBox="1">
+            <a:spLocks noGrp="1"/>
+          </p:cNvSpPr>
+          <p:nvPr>
+            <p:ph type="title"/>
+          </p:nvPr>
+        </p:nvSpPr>
+        <p:spPr>
+          <a:xfrm>
+            <a:off x="311700" y="445025"/>
+            <a:ext cx="8520600" cy="572700"/>
+          </a:xfrm>
+          <a:prstGeom prst="rect">
+            <a:avLst/>
+          </a:prstGeom>
+        </p:spPr>
+        <p:txBody>
+          <a:bodyPr spcFirstLastPara="1" wrap="square" lIns="91425" tIns="91425" rIns="91425" bIns="91425" anchor="t" anchorCtr="0">
+            <a:normAutofit fontScale="90000"/>
+          </a:bodyPr>
+          <a:lstStyle/>
+          <a:p>
+            <a:pPr marL="0" lvl="0" indent="0" algn="l" rtl="0">
+              <a:spcBef>
+                <a:spcPts val="0"/>
+              </a:spcBef>
+              <a:spcAft>
+                <a:spcPts val="0"/>
+              </a:spcAft>
+              <a:buNone/>
+            </a:pPr>
+            <a:endParaRPr/>
+          </a:p>
+        </p:txBody>
+      </p:sp>
+      <p:pic>
+        <p:nvPicPr>
+          <p:cNvPr id="80" name="Google Shape;80;p16"/>
+          <p:cNvPicPr preferRelativeResize="0"/>
+          <p:nvPr/>
+        </p:nvPicPr>
+        <p:blipFill>
+          <a:blip r:embed="rId3">
+            <a:alphaModFix/>
+          </a:blip>
+          <a:stretch>
+            <a:fillRect/>
+          </a:stretch>
+        </p:blipFill>
+        <p:spPr>
+          <a:xfrm>
+            <a:off x="0" y="0"/>
+            <a:ext cx="9144003" cy="5143501"/>
+          </a:xfrm>
+          <a:prstGeom prst="rect">
+            <a:avLst/>
+          </a:prstGeom>
+          <a:noFill/>
+          <a:ln>
+            <a:noFill/>
+          </a:ln>
+        </p:spPr>
+      </p:pic>
+      <p:sp>
+        <p:nvSpPr>
+          <p:cNvPr id="7" name="Google Shape;80;p16">
+            <a:extLst>
+              <a:ext uri="{FF2B5EF4-FFF2-40B4-BE49-F238E27FC236}">
+                <a16:creationId xmlns:a16="http://schemas.microsoft.com/office/drawing/2014/main" id="{2A45FA4F-C9D0-456A-BF4D-72ADD3A8F203}"/>
+              </a:ext>
+            </a:extLst>
+          </p:cNvPr>
+          <p:cNvSpPr txBox="1"/>
+          <p:nvPr/>
+        </p:nvSpPr>
+        <p:spPr>
+          <a:xfrm>
+            <a:off x="0" y="666802"/>
+            <a:ext cx="8680800" cy="492600"/>
+          </a:xfrm>
+          <a:prstGeom prst="rect">
+            <a:avLst/>
+          </a:prstGeom>
+          <a:noFill/>
+          <a:ln>
+            <a:noFill/>
+          </a:ln>
+        </p:spPr>
+        <p:txBody>
+          <a:bodyPr spcFirstLastPara="1" wrap="square" lIns="91425" tIns="91425" rIns="91425" bIns="91425" anchor="t" anchorCtr="0">
+            <a:noAutofit/>
+          </a:bodyPr>
+          <a:lstStyle/>
+          <a:p>
+            <a:pPr marL="0" lvl="0" indent="0" algn="l" rtl="0">
+              <a:spcBef>
+                <a:spcPts val="0"/>
+              </a:spcBef>
+              <a:spcAft>
+                <a:spcPts val="0"/>
+              </a:spcAft>
+              <a:buNone/>
+            </a:pPr>
+            <a:r>
+              <a:rPr lang="en-GB" sz="1800" dirty="0">
+                <a:solidFill>
+                  <a:srgbClr val="595959"/>
+                </a:solidFill>
+                <a:latin typeface="Cambria" panose="02040503050406030204" pitchFamily="18" charset="0"/>
+                <a:ea typeface="Cambria" panose="02040503050406030204" pitchFamily="18" charset="0"/>
+              </a:rPr>
+              <a:t>Application Architecture (Cloud Native)</a:t>
+            </a:r>
+            <a:endParaRPr sz="1800" dirty="0">
+              <a:solidFill>
+                <a:srgbClr val="595959"/>
+              </a:solidFill>
+              <a:latin typeface="Cambria" panose="02040503050406030204" pitchFamily="18" charset="0"/>
+              <a:ea typeface="Cambria" panose="02040503050406030204" pitchFamily="18" charset="0"/>
+            </a:endParaRPr>
+          </a:p>
+        </p:txBody>
+      </p:sp>
+      <p:pic>
+        <p:nvPicPr>
+          <p:cNvPr id="4" name="Picture 3">
+            <a:extLst>
+              <a:ext uri="{FF2B5EF4-FFF2-40B4-BE49-F238E27FC236}">
+                <a16:creationId xmlns:a16="http://schemas.microsoft.com/office/drawing/2014/main" id="{2E537ABD-2337-491B-BE22-2C51C8CF5C9D}"/>
+              </a:ext>
+            </a:extLst>
+          </p:cNvPr>
+          <p:cNvPicPr>
+            <a:picLocks noChangeAspect="1"/>
+          </p:cNvPicPr>
+          <p:nvPr/>
+        </p:nvPicPr>
+        <p:blipFill>
+          <a:blip r:embed="rId4"/>
+          <a:stretch>
+            <a:fillRect/>
+          </a:stretch>
+        </p:blipFill>
+        <p:spPr>
+          <a:xfrm>
+            <a:off x="843252" y="1323870"/>
+            <a:ext cx="7457496" cy="3077001"/>
+          </a:xfrm>
+          <a:prstGeom prst="rect">
+            <a:avLst/>
+          </a:prstGeom>
+        </p:spPr>
+      </p:pic>
+      <p:sp>
+        <p:nvSpPr>
+          <p:cNvPr id="9" name="TextBox 8">
+            <a:extLst>
+              <a:ext uri="{FF2B5EF4-FFF2-40B4-BE49-F238E27FC236}">
+                <a16:creationId xmlns:a16="http://schemas.microsoft.com/office/drawing/2014/main" id="{61DD1687-6C26-4B0D-BA78-2B108249405B}"/>
+              </a:ext>
+            </a:extLst>
+          </p:cNvPr>
+          <p:cNvSpPr txBox="1"/>
+          <p:nvPr/>
+        </p:nvSpPr>
+        <p:spPr>
+          <a:xfrm>
+            <a:off x="1157345" y="4590753"/>
+            <a:ext cx="6944664" cy="215444"/>
+          </a:xfrm>
+          <a:prstGeom prst="rect">
+            <a:avLst/>
+          </a:prstGeom>
+          <a:noFill/>
+        </p:spPr>
+        <p:txBody>
+          <a:bodyPr wrap="square" rtlCol="0">
+            <a:spAutoFit/>
+          </a:bodyPr>
+          <a:lstStyle/>
+          <a:p>
+            <a:r>
+              <a:rPr lang="en-US" sz="800" i="1" dirty="0">
+                <a:solidFill>
+                  <a:srgbClr val="FF0000"/>
+                </a:solidFill>
+                <a:latin typeface="Calibri" panose="020F0502020204030204" pitchFamily="34" charset="0"/>
+                <a:cs typeface="Calibri" panose="020F0502020204030204" pitchFamily="34" charset="0"/>
+              </a:rPr>
+              <a:t>Note: While the above architecture have been designed following Azure Cloud Services, the same can be replicated with any other popular cloud platform available.</a:t>
+            </a:r>
+            <a:endParaRPr lang="en-IN" sz="800" i="1" dirty="0">
+              <a:solidFill>
+                <a:srgbClr val="FF0000"/>
+              </a:solidFill>
+              <a:latin typeface="Calibri" panose="020F0502020204030204" pitchFamily="34" charset="0"/>
+              <a:cs typeface="Calibri" panose="020F0502020204030204" pitchFamily="34" charset="0"/>
+            </a:endParaRPr>
+          </a:p>
+        </p:txBody>
+      </p:sp>
+      <p:cxnSp>
+        <p:nvCxnSpPr>
+          <p:cNvPr id="10" name="Connector: Elbow 9">
+            <a:extLst>
+              <a:ext uri="{FF2B5EF4-FFF2-40B4-BE49-F238E27FC236}">
+                <a16:creationId xmlns:a16="http://schemas.microsoft.com/office/drawing/2014/main" id="{5B302F56-D29A-4B45-BAC2-1F3AE2EE8590}"/>
+              </a:ext>
+            </a:extLst>
+          </p:cNvPr>
+          <p:cNvCxnSpPr>
+            <a:cxnSpLocks/>
+          </p:cNvCxnSpPr>
+          <p:nvPr/>
+        </p:nvCxnSpPr>
+        <p:spPr>
+          <a:xfrm flipV="1">
+            <a:off x="6507126" y="3080568"/>
+            <a:ext cx="978195" cy="626651"/>
+          </a:xfrm>
+          <a:prstGeom prst="bentConnector3">
+            <a:avLst>
+              <a:gd name="adj1" fmla="val 50000"/>
+            </a:avLst>
+          </a:prstGeom>
+          <a:ln w="12700">
+            <a:tailEnd type="triangle"/>
+          </a:ln>
+        </p:spPr>
+        <p:style>
+          <a:lnRef idx="1">
+            <a:schemeClr val="dk1"/>
+          </a:lnRef>
+          <a:fillRef idx="0">
+            <a:schemeClr val="dk1"/>
+          </a:fillRef>
+          <a:effectRef idx="0">
+            <a:schemeClr val="dk1"/>
+          </a:effectRef>
+          <a:fontRef idx="minor">
+            <a:schemeClr val="tx1"/>
+          </a:fontRef>
+        </p:style>
+      </p:cxnSp>
+      <p:pic>
+        <p:nvPicPr>
+          <p:cNvPr id="19" name="Picture 18">
+            <a:extLst>
+              <a:ext uri="{FF2B5EF4-FFF2-40B4-BE49-F238E27FC236}">
+                <a16:creationId xmlns:a16="http://schemas.microsoft.com/office/drawing/2014/main" id="{F52ECE1B-B447-4863-9EBD-A22A4B813CE2}"/>
+              </a:ext>
+            </a:extLst>
+          </p:cNvPr>
+          <p:cNvPicPr>
+            <a:picLocks noChangeAspect="1"/>
+          </p:cNvPicPr>
+          <p:nvPr/>
+        </p:nvPicPr>
+        <p:blipFill>
+          <a:blip r:embed="rId5"/>
+          <a:stretch>
+            <a:fillRect/>
+          </a:stretch>
+        </p:blipFill>
+        <p:spPr>
+          <a:xfrm>
+            <a:off x="2056292" y="2239260"/>
+            <a:ext cx="274515" cy="274515"/>
+          </a:xfrm>
+          <a:prstGeom prst="rect">
+            <a:avLst/>
+          </a:prstGeom>
+        </p:spPr>
+      </p:pic>
+      <p:pic>
+        <p:nvPicPr>
+          <p:cNvPr id="20" name="Picture 19">
+            <a:extLst>
+              <a:ext uri="{FF2B5EF4-FFF2-40B4-BE49-F238E27FC236}">
+                <a16:creationId xmlns:a16="http://schemas.microsoft.com/office/drawing/2014/main" id="{345FCE79-3162-489D-BB1F-90A257E58034}"/>
+              </a:ext>
+            </a:extLst>
+          </p:cNvPr>
+          <p:cNvPicPr>
+            <a:picLocks noChangeAspect="1"/>
+          </p:cNvPicPr>
+          <p:nvPr/>
+        </p:nvPicPr>
+        <p:blipFill>
+          <a:blip r:embed="rId6"/>
+          <a:stretch>
+            <a:fillRect/>
+          </a:stretch>
+        </p:blipFill>
+        <p:spPr>
+          <a:xfrm>
+            <a:off x="3406589" y="2239260"/>
+            <a:ext cx="274515" cy="274515"/>
+          </a:xfrm>
+          <a:prstGeom prst="rect">
+            <a:avLst/>
+          </a:prstGeom>
+        </p:spPr>
+      </p:pic>
+      <p:pic>
+        <p:nvPicPr>
+          <p:cNvPr id="21" name="Picture 20">
+            <a:extLst>
+              <a:ext uri="{FF2B5EF4-FFF2-40B4-BE49-F238E27FC236}">
+                <a16:creationId xmlns:a16="http://schemas.microsoft.com/office/drawing/2014/main" id="{69D34B23-9EA1-41AF-9790-811313B307A7}"/>
+              </a:ext>
+            </a:extLst>
+          </p:cNvPr>
+          <p:cNvPicPr>
+            <a:picLocks noChangeAspect="1"/>
+          </p:cNvPicPr>
+          <p:nvPr/>
+        </p:nvPicPr>
+        <p:blipFill>
+          <a:blip r:embed="rId7"/>
+          <a:stretch>
+            <a:fillRect/>
+          </a:stretch>
+        </p:blipFill>
+        <p:spPr>
+          <a:xfrm>
+            <a:off x="3406589" y="1710328"/>
+            <a:ext cx="274516" cy="261748"/>
+          </a:xfrm>
+          <a:prstGeom prst="rect">
+            <a:avLst/>
+          </a:prstGeom>
+        </p:spPr>
+      </p:pic>
+      <p:pic>
+        <p:nvPicPr>
+          <p:cNvPr id="22" name="Picture 21">
+            <a:extLst>
+              <a:ext uri="{FF2B5EF4-FFF2-40B4-BE49-F238E27FC236}">
+                <a16:creationId xmlns:a16="http://schemas.microsoft.com/office/drawing/2014/main" id="{A287C689-3EDD-4F76-BF1D-0C7274ABC212}"/>
+              </a:ext>
+            </a:extLst>
+          </p:cNvPr>
+          <p:cNvPicPr>
+            <a:picLocks noChangeAspect="1"/>
+          </p:cNvPicPr>
+          <p:nvPr/>
+        </p:nvPicPr>
+        <p:blipFill>
+          <a:blip r:embed="rId8"/>
+          <a:stretch>
+            <a:fillRect/>
+          </a:stretch>
+        </p:blipFill>
+        <p:spPr>
+          <a:xfrm>
+            <a:off x="4200023" y="3077971"/>
+            <a:ext cx="280754" cy="274515"/>
+          </a:xfrm>
+          <a:prstGeom prst="rect">
+            <a:avLst/>
+          </a:prstGeom>
+        </p:spPr>
+      </p:pic>
+      <p:pic>
+        <p:nvPicPr>
+          <p:cNvPr id="23" name="Picture 22">
+            <a:extLst>
+              <a:ext uri="{FF2B5EF4-FFF2-40B4-BE49-F238E27FC236}">
+                <a16:creationId xmlns:a16="http://schemas.microsoft.com/office/drawing/2014/main" id="{F8F6843F-6344-4E99-83C4-22D684A879AA}"/>
+              </a:ext>
+            </a:extLst>
+          </p:cNvPr>
+          <p:cNvPicPr>
+            <a:picLocks noChangeAspect="1"/>
+          </p:cNvPicPr>
+          <p:nvPr/>
+        </p:nvPicPr>
+        <p:blipFill>
+          <a:blip r:embed="rId9"/>
+          <a:stretch>
+            <a:fillRect/>
+          </a:stretch>
+        </p:blipFill>
+        <p:spPr>
+          <a:xfrm>
+            <a:off x="5510877" y="2554976"/>
+            <a:ext cx="267979" cy="274515"/>
+          </a:xfrm>
+          <a:prstGeom prst="rect">
+            <a:avLst/>
+          </a:prstGeom>
+        </p:spPr>
+      </p:pic>
+      <p:pic>
+        <p:nvPicPr>
+          <p:cNvPr id="24" name="Picture 23">
+            <a:extLst>
+              <a:ext uri="{FF2B5EF4-FFF2-40B4-BE49-F238E27FC236}">
+                <a16:creationId xmlns:a16="http://schemas.microsoft.com/office/drawing/2014/main" id="{1D5F0CD5-20E7-4265-8A8E-30B62A65E210}"/>
+              </a:ext>
+            </a:extLst>
+          </p:cNvPr>
+          <p:cNvPicPr>
+            <a:picLocks noChangeAspect="1"/>
+          </p:cNvPicPr>
+          <p:nvPr/>
+        </p:nvPicPr>
+        <p:blipFill>
+          <a:blip r:embed="rId10"/>
+          <a:stretch>
+            <a:fillRect/>
+          </a:stretch>
+        </p:blipFill>
+        <p:spPr>
+          <a:xfrm>
+            <a:off x="7087708" y="2481515"/>
+            <a:ext cx="248326" cy="261749"/>
+          </a:xfrm>
+          <a:prstGeom prst="rect">
+            <a:avLst/>
+          </a:prstGeom>
+        </p:spPr>
+      </p:pic>
+    </p:spTree>
+    <p:extLst>
+      <p:ext uri="{BB962C8B-B14F-4D97-AF65-F5344CB8AC3E}">
+        <p14:creationId xmlns:p14="http://schemas.microsoft.com/office/powerpoint/2010/main" val="1277522324"/>
       </p:ext>
     </p:extLst>
   </p:cSld>
@@ -19877,7 +19777,7 @@
         <p:spPr>
           <a:xfrm>
             <a:off x="311700" y="1251013"/>
-            <a:ext cx="8468149" cy="3323987"/>
+            <a:ext cx="8468149" cy="3262432"/>
           </a:xfrm>
           <a:prstGeom prst="rect">
             <a:avLst/>
@@ -20110,6 +20010,16 @@
               <a:buFont typeface="Arial" panose="020B0604020202020204" pitchFamily="34" charset="0"/>
               <a:buChar char="•"/>
             </a:pPr>
+            <a:endParaRPr lang="en-US" dirty="0">
+              <a:latin typeface="Calibri" panose="020F0502020204030204" pitchFamily="34" charset="0"/>
+              <a:cs typeface="Calibri" panose="020F0502020204030204" pitchFamily="34" charset="0"/>
+            </a:endParaRPr>
+          </a:p>
+          <a:p>
+            <a:pPr marL="285750" indent="-285750" algn="just">
+              <a:buFont typeface="Arial" panose="020B0604020202020204" pitchFamily="34" charset="0"/>
+              <a:buChar char="•"/>
+            </a:pPr>
             <a:endParaRPr lang="en-IN" dirty="0">
               <a:latin typeface="Calibri" panose="020F0502020204030204" pitchFamily="34" charset="0"/>
               <a:cs typeface="Calibri" panose="020F0502020204030204" pitchFamily="34" charset="0"/>
@@ -20121,13 +20031,19 @@
               <a:buChar char="•"/>
             </a:pPr>
             <a:r>
-              <a:rPr lang="en-IN" dirty="0">
+              <a:rPr lang="en-IN" sz="1200" dirty="0">
+                <a:solidFill>
+                  <a:srgbClr val="FF0000"/>
+                </a:solidFill>
                 <a:latin typeface="Calibri" panose="020F0502020204030204" pitchFamily="34" charset="0"/>
                 <a:cs typeface="Calibri" panose="020F0502020204030204" pitchFamily="34" charset="0"/>
               </a:rPr>
-              <a:t>As the social media APIs are a paid service and no no-cost options are available, the data ingestion process though Kafka streaming couldn’t be implemented in the prototype phase, but it will be a crucial part of the final product implementation.</a:t>
+              <a:t>As the social media APIs are a paid service and no no-cost options are available, the exact architecture mentioned couldn’t be implement for the prototype, but it can be done in a production application following the same concept.</a:t>
             </a:r>
-            <a:endParaRPr lang="en-US" dirty="0">
+            <a:endParaRPr lang="en-US" sz="1200" dirty="0">
+              <a:solidFill>
+                <a:srgbClr val="FF0000"/>
+              </a:solidFill>
               <a:latin typeface="Calibri" panose="020F0502020204030204" pitchFamily="34" charset="0"/>
               <a:cs typeface="Calibri" panose="020F0502020204030204" pitchFamily="34" charset="0"/>
             </a:endParaRPr>

</xml_diff>